<commit_message>
Pulled in diagrams for F mode, generated in the delayswitch branch of decel-sim.
</commit_message>
<xml_diff>
--- a/Configurations/pinpairformal6.pptx
+++ b/Configurations/pinpairformal6.pptx
@@ -3368,10 +3368,10 @@
         </p:nvGrpSpPr>
         <p:grpSpPr>
           <a:xfrm>
-            <a:off x="-4044" y="3030642"/>
-            <a:ext cx="8166792" cy="2164784"/>
-            <a:chOff x="254587" y="3102079"/>
-            <a:chExt cx="8166792" cy="2164784"/>
+            <a:off x="-36686" y="2751129"/>
+            <a:ext cx="8199434" cy="2475074"/>
+            <a:chOff x="221945" y="2822566"/>
+            <a:chExt cx="8199434" cy="2475074"/>
           </a:xfrm>
         </p:grpSpPr>
         <p:grpSp>
@@ -3383,9 +3383,9 @@
           <p:grpSpPr>
             <a:xfrm>
               <a:off x="731917" y="3232846"/>
-              <a:ext cx="7689462" cy="2034017"/>
+              <a:ext cx="7689462" cy="2064794"/>
               <a:chOff x="454519" y="3232846"/>
-              <a:chExt cx="7689462" cy="2034017"/>
+              <a:chExt cx="7689462" cy="2064794"/>
             </a:xfrm>
           </p:grpSpPr>
           <p:pic>
@@ -4048,7 +4048,7 @@
             <p:spPr>
               <a:xfrm>
                 <a:off x="5574303" y="4974475"/>
-                <a:ext cx="1787703" cy="292388"/>
+                <a:ext cx="1787703" cy="323165"/>
               </a:xfrm>
               <a:prstGeom prst="rect">
                 <a:avLst/>
@@ -4062,7 +4062,7 @@
               <a:lstStyle/>
               <a:p>
                 <a:r>
-                  <a:rPr lang="en-US" sz="1300" dirty="0"/>
+                  <a:rPr lang="en-US" sz="1500" dirty="0"/>
                   <a:t>Distance (mm)</a:t>
                 </a:r>
               </a:p>
@@ -4077,7 +4077,7 @@
             <p:spPr>
               <a:xfrm>
                 <a:off x="1787835" y="4974475"/>
-                <a:ext cx="1787703" cy="292388"/>
+                <a:ext cx="1787703" cy="323165"/>
               </a:xfrm>
               <a:prstGeom prst="rect">
                 <a:avLst/>
@@ -4091,7 +4091,7 @@
               <a:lstStyle/>
               <a:p>
                 <a:r>
-                  <a:rPr lang="en-US" sz="1300" dirty="0"/>
+                  <a:rPr lang="en-US" sz="1500" dirty="0"/>
                   <a:t>Distance (mm)</a:t>
                 </a:r>
               </a:p>
@@ -4106,8 +4106,8 @@
           </p:nvSpPr>
           <p:spPr>
             <a:xfrm rot="16200000">
-              <a:off x="-504972" y="3861638"/>
-              <a:ext cx="1811505" cy="292388"/>
+              <a:off x="-687861" y="3732372"/>
+              <a:ext cx="2142777" cy="323165"/>
             </a:xfrm>
             <a:prstGeom prst="rect">
               <a:avLst/>
@@ -4121,7 +4121,7 @@
             <a:lstStyle/>
             <a:p>
               <a:r>
-                <a:rPr lang="en-US" sz="1300" dirty="0"/>
+                <a:rPr lang="en-US" sz="1500" dirty="0"/>
                 <a:t>E-Field Norm (kV/cm)</a:t>
               </a:r>
             </a:p>
@@ -9692,8 +9692,8 @@
         </p:nvSpPr>
         <p:spPr>
           <a:xfrm rot="16200000">
-            <a:off x="-719834" y="1766438"/>
-            <a:ext cx="1787703" cy="292388"/>
+            <a:off x="-737087" y="1820062"/>
+            <a:ext cx="1787703" cy="323165"/>
           </a:xfrm>
           <a:prstGeom prst="rect">
             <a:avLst/>
@@ -9707,7 +9707,7 @@
           <a:lstStyle/>
           <a:p>
             <a:r>
-              <a:rPr lang="en-US" sz="1300" dirty="0"/>
+              <a:rPr lang="en-US" sz="1500" dirty="0"/>
               <a:t>Distance (mm)</a:t>
             </a:r>
           </a:p>
@@ -9721,8 +9721,8 @@
         </p:nvSpPr>
         <p:spPr>
           <a:xfrm rot="16200000">
-            <a:off x="-707486" y="265043"/>
-            <a:ext cx="1787703" cy="292388"/>
+            <a:off x="-724739" y="318667"/>
+            <a:ext cx="1787703" cy="323165"/>
           </a:xfrm>
           <a:prstGeom prst="rect">
             <a:avLst/>
@@ -9736,7 +9736,7 @@
           <a:lstStyle/>
           <a:p>
             <a:r>
-              <a:rPr lang="en-US" sz="1300" dirty="0"/>
+              <a:rPr lang="en-US" sz="1500" dirty="0"/>
               <a:t>Distance (mm)</a:t>
             </a:r>
           </a:p>
@@ -9771,245 +9771,6 @@
           </a:prstGeom>
         </p:spPr>
       </p:pic>
-      <p:sp>
-        <p:nvSpPr>
-          <p:cNvPr id="718" name="TextBox 717"/>
-          <p:cNvSpPr txBox="1"/>
-          <p:nvPr/>
-        </p:nvSpPr>
-        <p:spPr>
-          <a:xfrm>
-            <a:off x="8904650" y="3224960"/>
-            <a:ext cx="559559" cy="369332"/>
-          </a:xfrm>
-          <a:prstGeom prst="rect">
-            <a:avLst/>
-          </a:prstGeom>
-          <a:noFill/>
-        </p:spPr>
-        <p:txBody>
-          <a:bodyPr wrap="square" rtlCol="0">
-            <a:spAutoFit/>
-          </a:bodyPr>
-          <a:lstStyle/>
-          <a:p>
-            <a:r>
-              <a:rPr lang="en-US" dirty="0"/>
-              <a:t>A'</a:t>
-            </a:r>
-          </a:p>
-        </p:txBody>
-      </p:sp>
-      <p:sp>
-        <p:nvSpPr>
-          <p:cNvPr id="719" name="TextBox 718"/>
-          <p:cNvSpPr txBox="1"/>
-          <p:nvPr/>
-        </p:nvSpPr>
-        <p:spPr>
-          <a:xfrm>
-            <a:off x="9816058" y="3224960"/>
-            <a:ext cx="559559" cy="369332"/>
-          </a:xfrm>
-          <a:prstGeom prst="rect">
-            <a:avLst/>
-          </a:prstGeom>
-          <a:noFill/>
-        </p:spPr>
-        <p:txBody>
-          <a:bodyPr wrap="square" rtlCol="0">
-            <a:spAutoFit/>
-          </a:bodyPr>
-          <a:lstStyle/>
-          <a:p>
-            <a:r>
-              <a:rPr lang="en-US" dirty="0"/>
-              <a:t>A</a:t>
-            </a:r>
-          </a:p>
-        </p:txBody>
-      </p:sp>
-      <p:sp>
-        <p:nvSpPr>
-          <p:cNvPr id="720" name="TextBox 719"/>
-          <p:cNvSpPr txBox="1"/>
-          <p:nvPr/>
-        </p:nvSpPr>
-        <p:spPr>
-          <a:xfrm>
-            <a:off x="10727466" y="3224960"/>
-            <a:ext cx="559559" cy="369332"/>
-          </a:xfrm>
-          <a:prstGeom prst="rect">
-            <a:avLst/>
-          </a:prstGeom>
-          <a:noFill/>
-        </p:spPr>
-        <p:txBody>
-          <a:bodyPr wrap="square" rtlCol="0">
-            <a:spAutoFit/>
-          </a:bodyPr>
-          <a:lstStyle/>
-          <a:p>
-            <a:r>
-              <a:rPr lang="en-US" dirty="0"/>
-              <a:t>A'</a:t>
-            </a:r>
-          </a:p>
-        </p:txBody>
-      </p:sp>
-      <p:sp>
-        <p:nvSpPr>
-          <p:cNvPr id="721" name="TextBox 720"/>
-          <p:cNvSpPr txBox="1"/>
-          <p:nvPr/>
-        </p:nvSpPr>
-        <p:spPr>
-          <a:xfrm>
-            <a:off x="9360354" y="3450988"/>
-            <a:ext cx="559559" cy="369332"/>
-          </a:xfrm>
-          <a:prstGeom prst="rect">
-            <a:avLst/>
-          </a:prstGeom>
-          <a:noFill/>
-        </p:spPr>
-        <p:txBody>
-          <a:bodyPr wrap="square" rtlCol="0">
-            <a:spAutoFit/>
-          </a:bodyPr>
-          <a:lstStyle/>
-          <a:p>
-            <a:r>
-              <a:rPr lang="en-US" dirty="0">
-                <a:solidFill>
-                  <a:srgbClr val="FF0000"/>
-                </a:solidFill>
-              </a:rPr>
-              <a:t>E</a:t>
-            </a:r>
-            <a:endParaRPr lang="en-US" dirty="0">
-              <a:solidFill>
-                <a:srgbClr val="FF0000"/>
-              </a:solidFill>
-            </a:endParaRPr>
-          </a:p>
-        </p:txBody>
-      </p:sp>
-      <p:sp>
-        <p:nvSpPr>
-          <p:cNvPr id="722" name="TextBox 721"/>
-          <p:cNvSpPr txBox="1"/>
-          <p:nvPr/>
-        </p:nvSpPr>
-        <p:spPr>
-          <a:xfrm>
-            <a:off x="10271762" y="3450988"/>
-            <a:ext cx="559559" cy="369332"/>
-          </a:xfrm>
-          <a:prstGeom prst="rect">
-            <a:avLst/>
-          </a:prstGeom>
-          <a:noFill/>
-        </p:spPr>
-        <p:txBody>
-          <a:bodyPr wrap="square" rtlCol="0">
-            <a:spAutoFit/>
-          </a:bodyPr>
-          <a:lstStyle/>
-          <a:p>
-            <a:r>
-              <a:rPr lang="en-US" dirty="0">
-                <a:solidFill>
-                  <a:srgbClr val="FF0000"/>
-                </a:solidFill>
-              </a:rPr>
-              <a:t>D'</a:t>
-            </a:r>
-            <a:endParaRPr lang="en-US" dirty="0">
-              <a:solidFill>
-                <a:srgbClr val="FF0000"/>
-              </a:solidFill>
-            </a:endParaRPr>
-          </a:p>
-        </p:txBody>
-      </p:sp>
-      <p:sp>
-        <p:nvSpPr>
-          <p:cNvPr id="723" name="TextBox 722"/>
-          <p:cNvSpPr txBox="1"/>
-          <p:nvPr/>
-        </p:nvSpPr>
-        <p:spPr>
-          <a:xfrm>
-            <a:off x="11183170" y="3450988"/>
-            <a:ext cx="559559" cy="369332"/>
-          </a:xfrm>
-          <a:prstGeom prst="rect">
-            <a:avLst/>
-          </a:prstGeom>
-          <a:noFill/>
-        </p:spPr>
-        <p:txBody>
-          <a:bodyPr wrap="square" rtlCol="0">
-            <a:spAutoFit/>
-          </a:bodyPr>
-          <a:lstStyle/>
-          <a:p>
-            <a:r>
-              <a:rPr lang="en-US" dirty="0">
-                <a:solidFill>
-                  <a:srgbClr val="FF0000"/>
-                </a:solidFill>
-              </a:rPr>
-              <a:t>D</a:t>
-            </a:r>
-            <a:endParaRPr lang="en-US" dirty="0">
-              <a:solidFill>
-                <a:srgbClr val="FF0000"/>
-              </a:solidFill>
-            </a:endParaRPr>
-          </a:p>
-        </p:txBody>
-      </p:sp>
-      <p:sp>
-        <p:nvSpPr>
-          <p:cNvPr id="724" name="TextBox 723"/>
-          <p:cNvSpPr txBox="1"/>
-          <p:nvPr/>
-        </p:nvSpPr>
-        <p:spPr>
-          <a:xfrm>
-            <a:off x="8448946" y="3450988"/>
-            <a:ext cx="559559" cy="369332"/>
-          </a:xfrm>
-          <a:prstGeom prst="rect">
-            <a:avLst/>
-          </a:prstGeom>
-          <a:noFill/>
-        </p:spPr>
-        <p:txBody>
-          <a:bodyPr wrap="square" rtlCol="0">
-            <a:spAutoFit/>
-          </a:bodyPr>
-          <a:lstStyle/>
-          <a:p>
-            <a:r>
-              <a:rPr lang="en-US" dirty="0">
-                <a:solidFill>
-                  <a:srgbClr val="FF0000"/>
-                </a:solidFill>
-              </a:rPr>
-              <a:t>E'</a:t>
-            </a:r>
-            <a:endParaRPr lang="en-US" dirty="0">
-              <a:solidFill>
-                <a:srgbClr val="FF0000"/>
-              </a:solidFill>
-            </a:endParaRPr>
-          </a:p>
-        </p:txBody>
-      </p:sp>
       <p:sp>
         <p:nvSpPr>
           <p:cNvPr id="759" name="Rectangle 758"/>
@@ -10903,8 +10664,8 @@
         </p:nvSpPr>
         <p:spPr>
           <a:xfrm rot="16200000">
-            <a:off x="11700275" y="1186371"/>
-            <a:ext cx="1811505" cy="292388"/>
+            <a:off x="11563408" y="1034115"/>
+            <a:ext cx="2085239" cy="323165"/>
           </a:xfrm>
           <a:prstGeom prst="rect">
             <a:avLst/>
@@ -10918,51 +10679,9 @@
           <a:lstStyle/>
           <a:p>
             <a:r>
-              <a:rPr lang="en-US" sz="1300" dirty="0"/>
+              <a:rPr lang="en-US" sz="1500" dirty="0"/>
               <a:t>E-Field Norm (kV/cm)</a:t>
             </a:r>
-          </a:p>
-        </p:txBody>
-      </p:sp>
-      <p:sp>
-        <p:nvSpPr>
-          <p:cNvPr id="785" name="TextBox 784"/>
-          <p:cNvSpPr txBox="1"/>
-          <p:nvPr/>
-        </p:nvSpPr>
-        <p:spPr>
-          <a:xfrm>
-            <a:off x="8151159" y="3100818"/>
-            <a:ext cx="887143" cy="369332"/>
-          </a:xfrm>
-          <a:prstGeom prst="rect">
-            <a:avLst/>
-          </a:prstGeom>
-          <a:noFill/>
-        </p:spPr>
-        <p:txBody>
-          <a:bodyPr wrap="square" rtlCol="0">
-            <a:spAutoFit/>
-          </a:bodyPr>
-          <a:lstStyle/>
-          <a:p>
-            <a:r>
-              <a:rPr lang="en-US" dirty="0">
-                <a:effectLst>
-                  <a:glow rad="127000">
-                    <a:schemeClr val="bg1"/>
-                  </a:glow>
-                </a:effectLst>
-              </a:rPr>
-              <a:t>F</a:t>
-            </a:r>
-            <a:endParaRPr lang="en-US" dirty="0">
-              <a:effectLst>
-                <a:glow rad="127000">
-                  <a:schemeClr val="bg1"/>
-                </a:glow>
-              </a:effectLst>
-            </a:endParaRPr>
           </a:p>
         </p:txBody>
       </p:sp>
@@ -10974,7 +10693,7 @@
         </p:nvGrpSpPr>
         <p:grpSpPr>
           <a:xfrm>
-            <a:off x="8022901" y="2884688"/>
+            <a:off x="8022901" y="2901941"/>
             <a:ext cx="3902803" cy="292388"/>
             <a:chOff x="4483764" y="4814204"/>
             <a:chExt cx="3902803" cy="292388"/>
@@ -11949,10 +11668,10 @@
         </p:nvGrpSpPr>
         <p:grpSpPr>
           <a:xfrm>
-            <a:off x="11835584" y="2987275"/>
-            <a:ext cx="1191218" cy="997095"/>
-            <a:chOff x="8390694" y="3307312"/>
-            <a:chExt cx="1191218" cy="997095"/>
+            <a:off x="11835584" y="2972035"/>
+            <a:ext cx="1181058" cy="1012335"/>
+            <a:chOff x="8390694" y="3292072"/>
+            <a:chExt cx="1181058" cy="1012335"/>
           </a:xfrm>
         </p:grpSpPr>
         <p:sp>
@@ -12190,8 +11909,8 @@
           </p:nvSpPr>
           <p:spPr>
             <a:xfrm>
-              <a:off x="8826407" y="3307312"/>
-              <a:ext cx="559559" cy="307777"/>
+              <a:off x="8816247" y="3292072"/>
+              <a:ext cx="559559" cy="338554"/>
             </a:xfrm>
             <a:prstGeom prst="rect">
               <a:avLst/>
@@ -12205,7 +11924,7 @@
             <a:lstStyle/>
             <a:p>
               <a:r>
-                <a:rPr lang="en-US" sz="1400" dirty="0"/>
+                <a:rPr lang="en-US" sz="1600" dirty="0"/>
                 <a:t>A</a:t>
               </a:r>
             </a:p>
@@ -12219,8 +11938,8 @@
           </p:nvSpPr>
           <p:spPr>
             <a:xfrm>
-              <a:off x="8826407" y="3518595"/>
-              <a:ext cx="559559" cy="307777"/>
+              <a:off x="8816247" y="3503355"/>
+              <a:ext cx="559559" cy="338554"/>
             </a:xfrm>
             <a:prstGeom prst="rect">
               <a:avLst/>
@@ -12234,7 +11953,7 @@
             <a:lstStyle/>
             <a:p>
               <a:r>
-                <a:rPr lang="en-US" sz="1400" dirty="0"/>
+                <a:rPr lang="en-US" sz="1600" dirty="0"/>
                 <a:t>A'</a:t>
               </a:r>
             </a:p>
@@ -12248,8 +11967,8 @@
           </p:nvSpPr>
           <p:spPr>
             <a:xfrm>
-              <a:off x="8782863" y="3729878"/>
-              <a:ext cx="799049" cy="307777"/>
+              <a:off x="8772703" y="3714638"/>
+              <a:ext cx="799049" cy="338554"/>
             </a:xfrm>
             <a:prstGeom prst="rect">
               <a:avLst/>
@@ -12263,10 +11982,10 @@
             <a:lstStyle/>
             <a:p>
               <a:r>
-                <a:rPr lang="en-US" sz="1400" dirty="0"/>
+                <a:rPr lang="en-US" sz="1600" dirty="0"/>
                 <a:t>BCDE</a:t>
               </a:r>
-              <a:endParaRPr lang="en-US" sz="1400" dirty="0"/>
+              <a:endParaRPr lang="en-US" sz="1600" dirty="0"/>
             </a:p>
           </p:txBody>
         </p:sp>
@@ -12278,8 +11997,8 @@
           </p:nvSpPr>
           <p:spPr>
             <a:xfrm>
-              <a:off x="8761091" y="3941161"/>
-              <a:ext cx="788404" cy="307777"/>
+              <a:off x="8750931" y="3925921"/>
+              <a:ext cx="788404" cy="338554"/>
             </a:xfrm>
             <a:prstGeom prst="rect">
               <a:avLst/>
@@ -12293,188 +12012,8 @@
             <a:lstStyle/>
             <a:p>
               <a:r>
-                <a:rPr lang="en-US" sz="1400" dirty="0"/>
+                <a:rPr lang="en-US" sz="1600" dirty="0"/>
                 <a:t>Active</a:t>
-              </a:r>
-            </a:p>
-          </p:txBody>
-        </p:sp>
-      </p:grpSp>
-      <p:grpSp>
-        <p:nvGrpSpPr>
-          <p:cNvPr id="830" name="Group 829"/>
-          <p:cNvGrpSpPr/>
-          <p:nvPr/>
-        </p:nvGrpSpPr>
-        <p:grpSpPr>
-          <a:xfrm>
-            <a:off x="8033706" y="3874894"/>
-            <a:ext cx="3902803" cy="292388"/>
-            <a:chOff x="4483764" y="4814204"/>
-            <a:chExt cx="3902803" cy="292388"/>
-          </a:xfrm>
-        </p:grpSpPr>
-        <p:sp>
-          <p:nvSpPr>
-            <p:cNvPr id="831" name="TextBox 830"/>
-            <p:cNvSpPr txBox="1"/>
-            <p:nvPr/>
-          </p:nvSpPr>
-          <p:spPr>
-            <a:xfrm>
-              <a:off x="4483764" y="4814204"/>
-              <a:ext cx="277640" cy="292388"/>
-            </a:xfrm>
-            <a:prstGeom prst="rect">
-              <a:avLst/>
-            </a:prstGeom>
-            <a:noFill/>
-          </p:spPr>
-          <p:txBody>
-            <a:bodyPr wrap="none" rtlCol="0">
-              <a:spAutoFit/>
-            </a:bodyPr>
-            <a:lstStyle/>
-            <a:p>
-              <a:r>
-                <a:rPr lang="en-US" sz="1300" dirty="0">
-                  <a:latin typeface="Helvetica" charset="0"/>
-                  <a:ea typeface="Helvetica" charset="0"/>
-                  <a:cs typeface="Helvetica" charset="0"/>
-                </a:rPr>
-                <a:t>0</a:t>
-              </a:r>
-            </a:p>
-          </p:txBody>
-        </p:sp>
-        <p:sp>
-          <p:nvSpPr>
-            <p:cNvPr id="832" name="TextBox 831"/>
-            <p:cNvSpPr txBox="1"/>
-            <p:nvPr/>
-          </p:nvSpPr>
-          <p:spPr>
-            <a:xfrm>
-              <a:off x="5367622" y="4814204"/>
-              <a:ext cx="277640" cy="292388"/>
-            </a:xfrm>
-            <a:prstGeom prst="rect">
-              <a:avLst/>
-            </a:prstGeom>
-            <a:noFill/>
-          </p:spPr>
-          <p:txBody>
-            <a:bodyPr wrap="none" rtlCol="0">
-              <a:spAutoFit/>
-            </a:bodyPr>
-            <a:lstStyle/>
-            <a:p>
-              <a:r>
-                <a:rPr lang="en-US" sz="1300" dirty="0">
-                  <a:latin typeface="Helvetica" charset="0"/>
-                  <a:ea typeface="Helvetica" charset="0"/>
-                  <a:cs typeface="Helvetica" charset="0"/>
-                </a:rPr>
-                <a:t>5</a:t>
-              </a:r>
-            </a:p>
-          </p:txBody>
-        </p:sp>
-        <p:sp>
-          <p:nvSpPr>
-            <p:cNvPr id="833" name="TextBox 832"/>
-            <p:cNvSpPr txBox="1"/>
-            <p:nvPr/>
-          </p:nvSpPr>
-          <p:spPr>
-            <a:xfrm>
-              <a:off x="6235714" y="4814204"/>
-              <a:ext cx="370614" cy="292388"/>
-            </a:xfrm>
-            <a:prstGeom prst="rect">
-              <a:avLst/>
-            </a:prstGeom>
-            <a:noFill/>
-          </p:spPr>
-          <p:txBody>
-            <a:bodyPr wrap="none" rtlCol="0">
-              <a:spAutoFit/>
-            </a:bodyPr>
-            <a:lstStyle/>
-            <a:p>
-              <a:r>
-                <a:rPr lang="en-US" sz="1300" dirty="0">
-                  <a:latin typeface="Helvetica" charset="0"/>
-                  <a:ea typeface="Helvetica" charset="0"/>
-                  <a:cs typeface="Helvetica" charset="0"/>
-                </a:rPr>
-                <a:t>10</a:t>
-              </a:r>
-            </a:p>
-          </p:txBody>
-        </p:sp>
-        <p:sp>
-          <p:nvSpPr>
-            <p:cNvPr id="834" name="TextBox 833"/>
-            <p:cNvSpPr txBox="1"/>
-            <p:nvPr/>
-          </p:nvSpPr>
-          <p:spPr>
-            <a:xfrm>
-              <a:off x="7141599" y="4814204"/>
-              <a:ext cx="370614" cy="292388"/>
-            </a:xfrm>
-            <a:prstGeom prst="rect">
-              <a:avLst/>
-            </a:prstGeom>
-            <a:noFill/>
-          </p:spPr>
-          <p:txBody>
-            <a:bodyPr wrap="none" rtlCol="0">
-              <a:spAutoFit/>
-            </a:bodyPr>
-            <a:lstStyle/>
-            <a:p>
-              <a:r>
-                <a:rPr lang="en-US" sz="1300" dirty="0">
-                  <a:latin typeface="Helvetica" charset="0"/>
-                  <a:ea typeface="Helvetica" charset="0"/>
-                  <a:cs typeface="Helvetica" charset="0"/>
-                </a:rPr>
-                <a:t>15</a:t>
-              </a:r>
-            </a:p>
-          </p:txBody>
-        </p:sp>
-        <p:sp>
-          <p:nvSpPr>
-            <p:cNvPr id="835" name="TextBox 834"/>
-            <p:cNvSpPr txBox="1"/>
-            <p:nvPr/>
-          </p:nvSpPr>
-          <p:spPr>
-            <a:xfrm>
-              <a:off x="8015953" y="4814204"/>
-              <a:ext cx="370614" cy="292388"/>
-            </a:xfrm>
-            <a:prstGeom prst="rect">
-              <a:avLst/>
-            </a:prstGeom>
-            <a:noFill/>
-          </p:spPr>
-          <p:txBody>
-            <a:bodyPr wrap="none" rtlCol="0">
-              <a:spAutoFit/>
-            </a:bodyPr>
-            <a:lstStyle/>
-            <a:p>
-              <a:r>
-                <a:rPr lang="en-US" sz="1300" dirty="0">
-                  <a:latin typeface="Helvetica" charset="0"/>
-                  <a:ea typeface="Helvetica" charset="0"/>
-                  <a:cs typeface="Helvetica" charset="0"/>
-                </a:rPr>
-                <a:t>20</a:t>
               </a:r>
             </a:p>
           </p:txBody>
@@ -12488,8 +12027,8 @@
         </p:nvSpPr>
         <p:spPr>
           <a:xfrm>
-            <a:off x="9322253" y="4113279"/>
-            <a:ext cx="1345284" cy="292388"/>
+            <a:off x="9322253" y="4027014"/>
+            <a:ext cx="1345284" cy="323165"/>
           </a:xfrm>
           <a:prstGeom prst="rect">
             <a:avLst/>
@@ -12503,11 +12042,11 @@
           <a:lstStyle/>
           <a:p>
             <a:r>
-              <a:rPr lang="en-US" sz="1300"/>
+              <a:rPr lang="en-US" sz="1500"/>
               <a:t>Distance </a:t>
             </a:r>
             <a:r>
-              <a:rPr lang="en-US" sz="1300" dirty="0"/>
+              <a:rPr lang="en-US" sz="1500" dirty="0"/>
               <a:t>(mm)</a:t>
             </a:r>
           </a:p>
@@ -14352,6 +13891,505 @@
             </a:p>
           </p:txBody>
         </p:sp>
+      </p:grpSp>
+      <p:pic>
+        <p:nvPicPr>
+          <p:cNvPr id="5" name="Picture 4"/>
+          <p:cNvPicPr>
+            <a:picLocks noChangeAspect="1"/>
+          </p:cNvPicPr>
+          <p:nvPr/>
+        </p:nvPicPr>
+        <p:blipFill rotWithShape="1">
+          <a:blip r:embed="rId10"/>
+          <a:srcRect t="-1699" b="-1"/>
+          <a:stretch/>
+        </p:blipFill>
+        <p:spPr>
+          <a:xfrm>
+            <a:off x="8085078" y="3136392"/>
+            <a:ext cx="3763731" cy="827531"/>
+          </a:xfrm>
+          <a:prstGeom prst="rect">
+            <a:avLst/>
+          </a:prstGeom>
+        </p:spPr>
+      </p:pic>
+      <p:grpSp>
+        <p:nvGrpSpPr>
+          <p:cNvPr id="6" name="Group 5"/>
+          <p:cNvGrpSpPr/>
+          <p:nvPr/>
+        </p:nvGrpSpPr>
+        <p:grpSpPr>
+          <a:xfrm>
+            <a:off x="8033706" y="3100818"/>
+            <a:ext cx="3902803" cy="1066464"/>
+            <a:chOff x="8033706" y="3100818"/>
+            <a:chExt cx="3902803" cy="1066464"/>
+          </a:xfrm>
+        </p:grpSpPr>
+        <p:sp>
+          <p:nvSpPr>
+            <p:cNvPr id="718" name="TextBox 717"/>
+            <p:cNvSpPr txBox="1"/>
+            <p:nvPr/>
+          </p:nvSpPr>
+          <p:spPr>
+            <a:xfrm>
+              <a:off x="8904650" y="3224960"/>
+              <a:ext cx="559559" cy="369332"/>
+            </a:xfrm>
+            <a:prstGeom prst="rect">
+              <a:avLst/>
+            </a:prstGeom>
+            <a:noFill/>
+          </p:spPr>
+          <p:txBody>
+            <a:bodyPr wrap="square" rtlCol="0">
+              <a:spAutoFit/>
+            </a:bodyPr>
+            <a:lstStyle/>
+            <a:p>
+              <a:r>
+                <a:rPr lang="en-US" dirty="0"/>
+                <a:t>A'</a:t>
+              </a:r>
+            </a:p>
+          </p:txBody>
+        </p:sp>
+        <p:sp>
+          <p:nvSpPr>
+            <p:cNvPr id="719" name="TextBox 718"/>
+            <p:cNvSpPr txBox="1"/>
+            <p:nvPr/>
+          </p:nvSpPr>
+          <p:spPr>
+            <a:xfrm>
+              <a:off x="9816058" y="3224960"/>
+              <a:ext cx="559559" cy="369332"/>
+            </a:xfrm>
+            <a:prstGeom prst="rect">
+              <a:avLst/>
+            </a:prstGeom>
+            <a:noFill/>
+          </p:spPr>
+          <p:txBody>
+            <a:bodyPr wrap="square" rtlCol="0">
+              <a:spAutoFit/>
+            </a:bodyPr>
+            <a:lstStyle/>
+            <a:p>
+              <a:r>
+                <a:rPr lang="en-US" dirty="0"/>
+                <a:t>A</a:t>
+              </a:r>
+            </a:p>
+          </p:txBody>
+        </p:sp>
+        <p:sp>
+          <p:nvSpPr>
+            <p:cNvPr id="720" name="TextBox 719"/>
+            <p:cNvSpPr txBox="1"/>
+            <p:nvPr/>
+          </p:nvSpPr>
+          <p:spPr>
+            <a:xfrm>
+              <a:off x="10727466" y="3224960"/>
+              <a:ext cx="559559" cy="369332"/>
+            </a:xfrm>
+            <a:prstGeom prst="rect">
+              <a:avLst/>
+            </a:prstGeom>
+            <a:noFill/>
+          </p:spPr>
+          <p:txBody>
+            <a:bodyPr wrap="square" rtlCol="0">
+              <a:spAutoFit/>
+            </a:bodyPr>
+            <a:lstStyle/>
+            <a:p>
+              <a:r>
+                <a:rPr lang="en-US" dirty="0"/>
+                <a:t>A'</a:t>
+              </a:r>
+            </a:p>
+          </p:txBody>
+        </p:sp>
+        <p:sp>
+          <p:nvSpPr>
+            <p:cNvPr id="721" name="TextBox 720"/>
+            <p:cNvSpPr txBox="1"/>
+            <p:nvPr/>
+          </p:nvSpPr>
+          <p:spPr>
+            <a:xfrm>
+              <a:off x="9360354" y="3526404"/>
+              <a:ext cx="559559" cy="369332"/>
+            </a:xfrm>
+            <a:prstGeom prst="rect">
+              <a:avLst/>
+            </a:prstGeom>
+            <a:noFill/>
+          </p:spPr>
+          <p:txBody>
+            <a:bodyPr wrap="square" rtlCol="0">
+              <a:spAutoFit/>
+            </a:bodyPr>
+            <a:lstStyle/>
+            <a:p>
+              <a:r>
+                <a:rPr lang="en-US" dirty="0">
+                  <a:solidFill>
+                    <a:srgbClr val="FF0000"/>
+                  </a:solidFill>
+                </a:rPr>
+                <a:t>E</a:t>
+              </a:r>
+              <a:endParaRPr lang="en-US" dirty="0">
+                <a:solidFill>
+                  <a:srgbClr val="FF0000"/>
+                </a:solidFill>
+              </a:endParaRPr>
+            </a:p>
+          </p:txBody>
+        </p:sp>
+        <p:sp>
+          <p:nvSpPr>
+            <p:cNvPr id="722" name="TextBox 721"/>
+            <p:cNvSpPr txBox="1"/>
+            <p:nvPr/>
+          </p:nvSpPr>
+          <p:spPr>
+            <a:xfrm>
+              <a:off x="10271762" y="3526404"/>
+              <a:ext cx="559559" cy="369332"/>
+            </a:xfrm>
+            <a:prstGeom prst="rect">
+              <a:avLst/>
+            </a:prstGeom>
+            <a:noFill/>
+          </p:spPr>
+          <p:txBody>
+            <a:bodyPr wrap="square" rtlCol="0">
+              <a:spAutoFit/>
+            </a:bodyPr>
+            <a:lstStyle/>
+            <a:p>
+              <a:r>
+                <a:rPr lang="en-US" dirty="0">
+                  <a:solidFill>
+                    <a:srgbClr val="FF0000"/>
+                  </a:solidFill>
+                </a:rPr>
+                <a:t>D'</a:t>
+              </a:r>
+              <a:endParaRPr lang="en-US" dirty="0">
+                <a:solidFill>
+                  <a:srgbClr val="FF0000"/>
+                </a:solidFill>
+              </a:endParaRPr>
+            </a:p>
+          </p:txBody>
+        </p:sp>
+        <p:sp>
+          <p:nvSpPr>
+            <p:cNvPr id="723" name="TextBox 722"/>
+            <p:cNvSpPr txBox="1"/>
+            <p:nvPr/>
+          </p:nvSpPr>
+          <p:spPr>
+            <a:xfrm>
+              <a:off x="11183170" y="3526404"/>
+              <a:ext cx="559559" cy="369332"/>
+            </a:xfrm>
+            <a:prstGeom prst="rect">
+              <a:avLst/>
+            </a:prstGeom>
+            <a:noFill/>
+          </p:spPr>
+          <p:txBody>
+            <a:bodyPr wrap="square" rtlCol="0">
+              <a:spAutoFit/>
+            </a:bodyPr>
+            <a:lstStyle/>
+            <a:p>
+              <a:r>
+                <a:rPr lang="en-US" dirty="0">
+                  <a:solidFill>
+                    <a:srgbClr val="FF0000"/>
+                  </a:solidFill>
+                </a:rPr>
+                <a:t>D</a:t>
+              </a:r>
+              <a:endParaRPr lang="en-US" dirty="0">
+                <a:solidFill>
+                  <a:srgbClr val="FF0000"/>
+                </a:solidFill>
+              </a:endParaRPr>
+            </a:p>
+          </p:txBody>
+        </p:sp>
+        <p:sp>
+          <p:nvSpPr>
+            <p:cNvPr id="724" name="TextBox 723"/>
+            <p:cNvSpPr txBox="1"/>
+            <p:nvPr/>
+          </p:nvSpPr>
+          <p:spPr>
+            <a:xfrm>
+              <a:off x="8448946" y="3526404"/>
+              <a:ext cx="559559" cy="369332"/>
+            </a:xfrm>
+            <a:prstGeom prst="rect">
+              <a:avLst/>
+            </a:prstGeom>
+            <a:noFill/>
+          </p:spPr>
+          <p:txBody>
+            <a:bodyPr wrap="square" rtlCol="0">
+              <a:spAutoFit/>
+            </a:bodyPr>
+            <a:lstStyle/>
+            <a:p>
+              <a:r>
+                <a:rPr lang="en-US" dirty="0">
+                  <a:solidFill>
+                    <a:srgbClr val="FF0000"/>
+                  </a:solidFill>
+                </a:rPr>
+                <a:t>E'</a:t>
+              </a:r>
+              <a:endParaRPr lang="en-US" dirty="0">
+                <a:solidFill>
+                  <a:srgbClr val="FF0000"/>
+                </a:solidFill>
+              </a:endParaRPr>
+            </a:p>
+          </p:txBody>
+        </p:sp>
+        <p:sp>
+          <p:nvSpPr>
+            <p:cNvPr id="785" name="TextBox 784"/>
+            <p:cNvSpPr txBox="1"/>
+            <p:nvPr/>
+          </p:nvSpPr>
+          <p:spPr>
+            <a:xfrm>
+              <a:off x="8151159" y="3100818"/>
+              <a:ext cx="887143" cy="369332"/>
+            </a:xfrm>
+            <a:prstGeom prst="rect">
+              <a:avLst/>
+            </a:prstGeom>
+            <a:noFill/>
+          </p:spPr>
+          <p:txBody>
+            <a:bodyPr wrap="square" rtlCol="0">
+              <a:spAutoFit/>
+            </a:bodyPr>
+            <a:lstStyle/>
+            <a:p>
+              <a:r>
+                <a:rPr lang="en-US" dirty="0">
+                  <a:effectLst>
+                    <a:glow rad="127000">
+                      <a:schemeClr val="bg1"/>
+                    </a:glow>
+                  </a:effectLst>
+                </a:rPr>
+                <a:t>F</a:t>
+              </a:r>
+              <a:endParaRPr lang="en-US" dirty="0">
+                <a:effectLst>
+                  <a:glow rad="127000">
+                    <a:schemeClr val="bg1"/>
+                  </a:glow>
+                </a:effectLst>
+              </a:endParaRPr>
+            </a:p>
+          </p:txBody>
+        </p:sp>
+        <p:grpSp>
+          <p:nvGrpSpPr>
+            <p:cNvPr id="830" name="Group 829"/>
+            <p:cNvGrpSpPr/>
+            <p:nvPr/>
+          </p:nvGrpSpPr>
+          <p:grpSpPr>
+            <a:xfrm>
+              <a:off x="8033706" y="3874894"/>
+              <a:ext cx="3902803" cy="292388"/>
+              <a:chOff x="4483764" y="4814204"/>
+              <a:chExt cx="3902803" cy="292388"/>
+            </a:xfrm>
+          </p:grpSpPr>
+          <p:sp>
+            <p:nvSpPr>
+              <p:cNvPr id="831" name="TextBox 830"/>
+              <p:cNvSpPr txBox="1"/>
+              <p:nvPr/>
+            </p:nvSpPr>
+            <p:spPr>
+              <a:xfrm>
+                <a:off x="4483764" y="4814204"/>
+                <a:ext cx="277640" cy="292388"/>
+              </a:xfrm>
+              <a:prstGeom prst="rect">
+                <a:avLst/>
+              </a:prstGeom>
+              <a:noFill/>
+            </p:spPr>
+            <p:txBody>
+              <a:bodyPr wrap="none" rtlCol="0">
+                <a:spAutoFit/>
+              </a:bodyPr>
+              <a:lstStyle/>
+              <a:p>
+                <a:r>
+                  <a:rPr lang="en-US" sz="1300" dirty="0">
+                    <a:latin typeface="Helvetica" charset="0"/>
+                    <a:ea typeface="Helvetica" charset="0"/>
+                    <a:cs typeface="Helvetica" charset="0"/>
+                  </a:rPr>
+                  <a:t>0</a:t>
+                </a:r>
+              </a:p>
+            </p:txBody>
+          </p:sp>
+          <p:sp>
+            <p:nvSpPr>
+              <p:cNvPr id="832" name="TextBox 831"/>
+              <p:cNvSpPr txBox="1"/>
+              <p:nvPr/>
+            </p:nvSpPr>
+            <p:spPr>
+              <a:xfrm>
+                <a:off x="5367622" y="4814204"/>
+                <a:ext cx="277640" cy="292388"/>
+              </a:xfrm>
+              <a:prstGeom prst="rect">
+                <a:avLst/>
+              </a:prstGeom>
+              <a:noFill/>
+            </p:spPr>
+            <p:txBody>
+              <a:bodyPr wrap="none" rtlCol="0">
+                <a:spAutoFit/>
+              </a:bodyPr>
+              <a:lstStyle/>
+              <a:p>
+                <a:r>
+                  <a:rPr lang="en-US" sz="1300" dirty="0">
+                    <a:latin typeface="Helvetica" charset="0"/>
+                    <a:ea typeface="Helvetica" charset="0"/>
+                    <a:cs typeface="Helvetica" charset="0"/>
+                  </a:rPr>
+                  <a:t>5</a:t>
+                </a:r>
+              </a:p>
+            </p:txBody>
+          </p:sp>
+          <p:sp>
+            <p:nvSpPr>
+              <p:cNvPr id="833" name="TextBox 832"/>
+              <p:cNvSpPr txBox="1"/>
+              <p:nvPr/>
+            </p:nvSpPr>
+            <p:spPr>
+              <a:xfrm>
+                <a:off x="6235714" y="4814204"/>
+                <a:ext cx="370614" cy="292388"/>
+              </a:xfrm>
+              <a:prstGeom prst="rect">
+                <a:avLst/>
+              </a:prstGeom>
+              <a:noFill/>
+            </p:spPr>
+            <p:txBody>
+              <a:bodyPr wrap="none" rtlCol="0">
+                <a:spAutoFit/>
+              </a:bodyPr>
+              <a:lstStyle/>
+              <a:p>
+                <a:r>
+                  <a:rPr lang="en-US" sz="1300" dirty="0">
+                    <a:latin typeface="Helvetica" charset="0"/>
+                    <a:ea typeface="Helvetica" charset="0"/>
+                    <a:cs typeface="Helvetica" charset="0"/>
+                  </a:rPr>
+                  <a:t>10</a:t>
+                </a:r>
+              </a:p>
+            </p:txBody>
+          </p:sp>
+          <p:sp>
+            <p:nvSpPr>
+              <p:cNvPr id="834" name="TextBox 833"/>
+              <p:cNvSpPr txBox="1"/>
+              <p:nvPr/>
+            </p:nvSpPr>
+            <p:spPr>
+              <a:xfrm>
+                <a:off x="7141599" y="4814204"/>
+                <a:ext cx="370614" cy="292388"/>
+              </a:xfrm>
+              <a:prstGeom prst="rect">
+                <a:avLst/>
+              </a:prstGeom>
+              <a:noFill/>
+            </p:spPr>
+            <p:txBody>
+              <a:bodyPr wrap="none" rtlCol="0">
+                <a:spAutoFit/>
+              </a:bodyPr>
+              <a:lstStyle/>
+              <a:p>
+                <a:r>
+                  <a:rPr lang="en-US" sz="1300" dirty="0">
+                    <a:latin typeface="Helvetica" charset="0"/>
+                    <a:ea typeface="Helvetica" charset="0"/>
+                    <a:cs typeface="Helvetica" charset="0"/>
+                  </a:rPr>
+                  <a:t>15</a:t>
+                </a:r>
+              </a:p>
+            </p:txBody>
+          </p:sp>
+          <p:sp>
+            <p:nvSpPr>
+              <p:cNvPr id="835" name="TextBox 834"/>
+              <p:cNvSpPr txBox="1"/>
+              <p:nvPr/>
+            </p:nvSpPr>
+            <p:spPr>
+              <a:xfrm>
+                <a:off x="8015953" y="4814204"/>
+                <a:ext cx="370614" cy="292388"/>
+              </a:xfrm>
+              <a:prstGeom prst="rect">
+                <a:avLst/>
+              </a:prstGeom>
+              <a:noFill/>
+            </p:spPr>
+            <p:txBody>
+              <a:bodyPr wrap="none" rtlCol="0">
+                <a:spAutoFit/>
+              </a:bodyPr>
+              <a:lstStyle/>
+              <a:p>
+                <a:r>
+                  <a:rPr lang="en-US" sz="1300" dirty="0">
+                    <a:latin typeface="Helvetica" charset="0"/>
+                    <a:ea typeface="Helvetica" charset="0"/>
+                    <a:cs typeface="Helvetica" charset="0"/>
+                  </a:rPr>
+                  <a:t>20</a:t>
+                </a:r>
+              </a:p>
+            </p:txBody>
+          </p:sp>
+        </p:grpSp>
       </p:grpSp>
     </p:spTree>
     <p:extLst>

</xml_diff>